<commit_message>
added next 3 modules
</commit_message>
<xml_diff>
--- a/Tamil Signs.pptx
+++ b/Tamil Signs.pptx
@@ -213,7 +213,7 @@
           <a:p>
             <a:fld id="{8CB43609-0408-4348-B094-3589D118FE3F}" type="datetimeFigureOut">
               <a:rPr lang="en-SG" smtClean="0"/>
-              <a:t>28/1/2026</a:t>
+              <a:t>30/1/2026</a:t>
             </a:fld>
             <a:endParaRPr lang="en-SG"/>
           </a:p>
@@ -927,7 +927,7 @@
           <a:p>
             <a:fld id="{85FACC78-2A18-470E-A100-D9E21194837E}" type="datetimeFigureOut">
               <a:rPr lang="en-SG" smtClean="0"/>
-              <a:t>28/1/2026</a:t>
+              <a:t>30/1/2026</a:t>
             </a:fld>
             <a:endParaRPr lang="en-SG"/>
           </a:p>
@@ -1127,7 +1127,7 @@
           <a:p>
             <a:fld id="{85FACC78-2A18-470E-A100-D9E21194837E}" type="datetimeFigureOut">
               <a:rPr lang="en-SG" smtClean="0"/>
-              <a:t>28/1/2026</a:t>
+              <a:t>30/1/2026</a:t>
             </a:fld>
             <a:endParaRPr lang="en-SG"/>
           </a:p>
@@ -1337,7 +1337,7 @@
           <a:p>
             <a:fld id="{85FACC78-2A18-470E-A100-D9E21194837E}" type="datetimeFigureOut">
               <a:rPr lang="en-SG" smtClean="0"/>
-              <a:t>28/1/2026</a:t>
+              <a:t>30/1/2026</a:t>
             </a:fld>
             <a:endParaRPr lang="en-SG"/>
           </a:p>
@@ -1537,7 +1537,7 @@
           <a:p>
             <a:fld id="{85FACC78-2A18-470E-A100-D9E21194837E}" type="datetimeFigureOut">
               <a:rPr lang="en-SG" smtClean="0"/>
-              <a:t>28/1/2026</a:t>
+              <a:t>30/1/2026</a:t>
             </a:fld>
             <a:endParaRPr lang="en-SG"/>
           </a:p>
@@ -1813,7 +1813,7 @@
           <a:p>
             <a:fld id="{85FACC78-2A18-470E-A100-D9E21194837E}" type="datetimeFigureOut">
               <a:rPr lang="en-SG" smtClean="0"/>
-              <a:t>28/1/2026</a:t>
+              <a:t>30/1/2026</a:t>
             </a:fld>
             <a:endParaRPr lang="en-SG"/>
           </a:p>
@@ -2081,7 +2081,7 @@
           <a:p>
             <a:fld id="{85FACC78-2A18-470E-A100-D9E21194837E}" type="datetimeFigureOut">
               <a:rPr lang="en-SG" smtClean="0"/>
-              <a:t>28/1/2026</a:t>
+              <a:t>30/1/2026</a:t>
             </a:fld>
             <a:endParaRPr lang="en-SG"/>
           </a:p>
@@ -2496,7 +2496,7 @@
           <a:p>
             <a:fld id="{85FACC78-2A18-470E-A100-D9E21194837E}" type="datetimeFigureOut">
               <a:rPr lang="en-SG" smtClean="0"/>
-              <a:t>28/1/2026</a:t>
+              <a:t>30/1/2026</a:t>
             </a:fld>
             <a:endParaRPr lang="en-SG"/>
           </a:p>
@@ -2638,7 +2638,7 @@
           <a:p>
             <a:fld id="{85FACC78-2A18-470E-A100-D9E21194837E}" type="datetimeFigureOut">
               <a:rPr lang="en-SG" smtClean="0"/>
-              <a:t>28/1/2026</a:t>
+              <a:t>30/1/2026</a:t>
             </a:fld>
             <a:endParaRPr lang="en-SG"/>
           </a:p>
@@ -2751,7 +2751,7 @@
           <a:p>
             <a:fld id="{85FACC78-2A18-470E-A100-D9E21194837E}" type="datetimeFigureOut">
               <a:rPr lang="en-SG" smtClean="0"/>
-              <a:t>28/1/2026</a:t>
+              <a:t>30/1/2026</a:t>
             </a:fld>
             <a:endParaRPr lang="en-SG"/>
           </a:p>
@@ -3064,7 +3064,7 @@
           <a:p>
             <a:fld id="{85FACC78-2A18-470E-A100-D9E21194837E}" type="datetimeFigureOut">
               <a:rPr lang="en-SG" smtClean="0"/>
-              <a:t>28/1/2026</a:t>
+              <a:t>30/1/2026</a:t>
             </a:fld>
             <a:endParaRPr lang="en-SG"/>
           </a:p>
@@ -3353,7 +3353,7 @@
           <a:p>
             <a:fld id="{85FACC78-2A18-470E-A100-D9E21194837E}" type="datetimeFigureOut">
               <a:rPr lang="en-SG" smtClean="0"/>
-              <a:t>28/1/2026</a:t>
+              <a:t>30/1/2026</a:t>
             </a:fld>
             <a:endParaRPr lang="en-SG"/>
           </a:p>
@@ -3596,7 +3596,7 @@
           <a:p>
             <a:fld id="{85FACC78-2A18-470E-A100-D9E21194837E}" type="datetimeFigureOut">
               <a:rPr lang="en-SG" smtClean="0"/>
-              <a:t>28/1/2026</a:t>
+              <a:t>30/1/2026</a:t>
             </a:fld>
             <a:endParaRPr lang="en-SG"/>
           </a:p>
@@ -9965,8 +9965,8 @@
           </a:p>
         </p:txBody>
       </p:sp>
-      <mc:AlternateContent xmlns:mc="http://schemas.openxmlformats.org/markup-compatibility/2006" xmlns:a14="http://schemas.microsoft.com/office/drawing/2010/main">
-        <mc:Choice Requires="a14">
+      <mc:AlternateContent xmlns:mc="http://schemas.openxmlformats.org/markup-compatibility/2006">
+        <mc:Choice xmlns:a14="http://schemas.microsoft.com/office/drawing/2010/main" Requires="a14">
           <p:sp>
             <p:nvSpPr>
               <p:cNvPr id="10" name="TextBox 9">
@@ -9981,7 +9981,7 @@
             </p:nvSpPr>
             <p:spPr>
               <a:xfrm>
-                <a:off x="5032203" y="1487145"/>
+                <a:off x="5032203" y="1441750"/>
                 <a:ext cx="4914576" cy="2603405"/>
               </a:xfrm>
               <a:prstGeom prst="rect">
@@ -10135,7 +10135,7 @@
             </p:txBody>
           </p:sp>
         </mc:Choice>
-        <mc:Fallback xmlns="">
+        <mc:Fallback>
           <p:sp>
             <p:nvSpPr>
               <p:cNvPr id="10" name="TextBox 9">
@@ -10152,7 +10152,7 @@
             </p:nvSpPr>
             <p:spPr>
               <a:xfrm>
-                <a:off x="5032203" y="1487145"/>
+                <a:off x="5032203" y="1441750"/>
                 <a:ext cx="4914576" cy="2603405"/>
               </a:xfrm>
               <a:prstGeom prst="rect">

</xml_diff>